<commit_message>
Implemented text to speech conversion and successfully published topic voice to send mp3 file and subscribed to it
</commit_message>
<xml_diff>
--- a/Intro/BusStopAssistant.pptx
+++ b/Intro/BusStopAssistant.pptx
@@ -6,6 +6,13 @@
   </p:sldMasterIdLst>
   <p:sldIdLst>
     <p:sldId id="256" r:id="rId5"/>
+    <p:sldId id="257" r:id="rId6"/>
+    <p:sldId id="263" r:id="rId7"/>
+    <p:sldId id="258" r:id="rId8"/>
+    <p:sldId id="259" r:id="rId9"/>
+    <p:sldId id="260" r:id="rId10"/>
+    <p:sldId id="261" r:id="rId11"/>
+    <p:sldId id="262" r:id="rId12"/>
   </p:sldIdLst>
   <p:sldSz cx="12192000" cy="6858000"/>
   <p:notesSz cx="6858000" cy="9144000"/>
@@ -104,7 +111,313 @@
       </a:defRPr>
     </a:lvl9pPr>
   </p:defaultTextStyle>
+  <p:extLst>
+    <p:ext uri="{EFAFB233-063F-42B5-8137-9DF3F51BA10A}">
+      <p15:sldGuideLst xmlns:p15="http://schemas.microsoft.com/office/powerpoint/2012/main"/>
+    </p:ext>
+  </p:extLst>
 </p:presentation>
+</file>
+
+<file path=ppt/revisionInfo.xml><?xml version="1.0" encoding="utf-8"?>
+<p1510:revInfo xmlns:a="http://schemas.openxmlformats.org/drawingml/2006/main" xmlns:r="http://schemas.openxmlformats.org/officeDocument/2006/relationships" xmlns:p1510="http://schemas.microsoft.com/office/powerpoint/2015/10/main">
+  <p1510:revLst>
+    <p1510:client id="{7EB0C8A7-9255-4B4D-B72A-2604A9812AF8}" v="39" dt="2019-10-30T09:59:23.211"/>
+  </p1510:revLst>
+</p1510:revInfo>
+</file>
+
+<file path=ppt/changesInfos/changesInfo1.xml><?xml version="1.0" encoding="utf-8"?>
+<pc:chgInfo xmlns:a="http://schemas.openxmlformats.org/drawingml/2006/main" xmlns:r="http://schemas.openxmlformats.org/officeDocument/2006/relationships" xmlns:ac="http://schemas.microsoft.com/office/drawing/2013/main/command" xmlns:pc="http://schemas.microsoft.com/office/powerpoint/2013/main/command">
+  <pc:docChgLst>
+    <pc:chgData name="Poornima Lakshmi Subramoni" userId="5be6b701-5b32-452b-a383-6fa42e8b5431" providerId="ADAL" clId="{7EB0C8A7-9255-4B4D-B72A-2604A9812AF8}"/>
+    <pc:docChg chg="undo custSel addSld delSld modSld sldOrd">
+      <pc:chgData name="Poornima Lakshmi Subramoni" userId="5be6b701-5b32-452b-a383-6fa42e8b5431" providerId="ADAL" clId="{7EB0C8A7-9255-4B4D-B72A-2604A9812AF8}" dt="2019-10-30T10:00:11.909" v="2376" actId="14100"/>
+      <pc:docMkLst>
+        <pc:docMk/>
+      </pc:docMkLst>
+      <pc:sldChg chg="modSp">
+        <pc:chgData name="Poornima Lakshmi Subramoni" userId="5be6b701-5b32-452b-a383-6fa42e8b5431" providerId="ADAL" clId="{7EB0C8A7-9255-4B4D-B72A-2604A9812AF8}" dt="2019-10-28T09:26:29.351" v="1526" actId="20577"/>
+        <pc:sldMkLst>
+          <pc:docMk/>
+          <pc:sldMk cId="3728795232" sldId="256"/>
+        </pc:sldMkLst>
+        <pc:spChg chg="mod">
+          <ac:chgData name="Poornima Lakshmi Subramoni" userId="5be6b701-5b32-452b-a383-6fa42e8b5431" providerId="ADAL" clId="{7EB0C8A7-9255-4B4D-B72A-2604A9812AF8}" dt="2019-10-28T09:26:29.351" v="1526" actId="20577"/>
+          <ac:spMkLst>
+            <pc:docMk/>
+            <pc:sldMk cId="3728795232" sldId="256"/>
+            <ac:spMk id="2" creationId="{43AFA4B7-C8DD-4F38-8088-80B00E0446B0}"/>
+          </ac:spMkLst>
+        </pc:spChg>
+      </pc:sldChg>
+      <pc:sldChg chg="addSp delSp modSp add">
+        <pc:chgData name="Poornima Lakshmi Subramoni" userId="5be6b701-5b32-452b-a383-6fa42e8b5431" providerId="ADAL" clId="{7EB0C8A7-9255-4B4D-B72A-2604A9812AF8}" dt="2019-10-30T10:00:11.909" v="2376" actId="14100"/>
+        <pc:sldMkLst>
+          <pc:docMk/>
+          <pc:sldMk cId="1869977938" sldId="257"/>
+        </pc:sldMkLst>
+        <pc:spChg chg="mod">
+          <ac:chgData name="Poornima Lakshmi Subramoni" userId="5be6b701-5b32-452b-a383-6fa42e8b5431" providerId="ADAL" clId="{7EB0C8A7-9255-4B4D-B72A-2604A9812AF8}" dt="2019-10-24T10:54:45.129" v="18" actId="20577"/>
+          <ac:spMkLst>
+            <pc:docMk/>
+            <pc:sldMk cId="1869977938" sldId="257"/>
+            <ac:spMk id="2" creationId="{166E58BA-31CC-408C-9581-7BA539B6CE38}"/>
+          </ac:spMkLst>
+        </pc:spChg>
+        <pc:spChg chg="mod">
+          <ac:chgData name="Poornima Lakshmi Subramoni" userId="5be6b701-5b32-452b-a383-6fa42e8b5431" providerId="ADAL" clId="{7EB0C8A7-9255-4B4D-B72A-2604A9812AF8}" dt="2019-10-30T10:00:11.909" v="2376" actId="14100"/>
+          <ac:spMkLst>
+            <pc:docMk/>
+            <pc:sldMk cId="1869977938" sldId="257"/>
+            <ac:spMk id="3" creationId="{EBF4C8F6-9317-42F7-AA8C-5E1A5A7AC280}"/>
+          </ac:spMkLst>
+        </pc:spChg>
+        <pc:picChg chg="add del mod">
+          <ac:chgData name="Poornima Lakshmi Subramoni" userId="5be6b701-5b32-452b-a383-6fa42e8b5431" providerId="ADAL" clId="{7EB0C8A7-9255-4B4D-B72A-2604A9812AF8}" dt="2019-10-30T09:59:32.497" v="2286" actId="478"/>
+          <ac:picMkLst>
+            <pc:docMk/>
+            <pc:sldMk cId="1869977938" sldId="257"/>
+            <ac:picMk id="4" creationId="{D9411F1D-F5E0-49A5-90EC-2CAEAFD59B42}"/>
+          </ac:picMkLst>
+        </pc:picChg>
+      </pc:sldChg>
+      <pc:sldChg chg="modSp add">
+        <pc:chgData name="Poornima Lakshmi Subramoni" userId="5be6b701-5b32-452b-a383-6fa42e8b5431" providerId="ADAL" clId="{7EB0C8A7-9255-4B4D-B72A-2604A9812AF8}" dt="2019-10-29T09:55:49.211" v="1987" actId="20577"/>
+        <pc:sldMkLst>
+          <pc:docMk/>
+          <pc:sldMk cId="3259167666" sldId="258"/>
+        </pc:sldMkLst>
+        <pc:spChg chg="mod">
+          <ac:chgData name="Poornima Lakshmi Subramoni" userId="5be6b701-5b32-452b-a383-6fa42e8b5431" providerId="ADAL" clId="{7EB0C8A7-9255-4B4D-B72A-2604A9812AF8}" dt="2019-10-24T11:21:14.841" v="484" actId="20577"/>
+          <ac:spMkLst>
+            <pc:docMk/>
+            <pc:sldMk cId="3259167666" sldId="258"/>
+            <ac:spMk id="2" creationId="{D706C0CF-CC1A-4B94-86C5-7F3943B0A434}"/>
+          </ac:spMkLst>
+        </pc:spChg>
+        <pc:spChg chg="mod">
+          <ac:chgData name="Poornima Lakshmi Subramoni" userId="5be6b701-5b32-452b-a383-6fa42e8b5431" providerId="ADAL" clId="{7EB0C8A7-9255-4B4D-B72A-2604A9812AF8}" dt="2019-10-29T09:55:49.211" v="1987" actId="20577"/>
+          <ac:spMkLst>
+            <pc:docMk/>
+            <pc:sldMk cId="3259167666" sldId="258"/>
+            <ac:spMk id="3" creationId="{97A714F8-02C0-479A-B185-DE151F65924A}"/>
+          </ac:spMkLst>
+        </pc:spChg>
+      </pc:sldChg>
+      <pc:sldChg chg="modSp add">
+        <pc:chgData name="Poornima Lakshmi Subramoni" userId="5be6b701-5b32-452b-a383-6fa42e8b5431" providerId="ADAL" clId="{7EB0C8A7-9255-4B4D-B72A-2604A9812AF8}" dt="2019-10-29T09:54:11.242" v="1962" actId="20577"/>
+        <pc:sldMkLst>
+          <pc:docMk/>
+          <pc:sldMk cId="4267623557" sldId="259"/>
+        </pc:sldMkLst>
+        <pc:spChg chg="mod">
+          <ac:chgData name="Poornima Lakshmi Subramoni" userId="5be6b701-5b32-452b-a383-6fa42e8b5431" providerId="ADAL" clId="{7EB0C8A7-9255-4B4D-B72A-2604A9812AF8}" dt="2019-10-24T10:55:24.386" v="51" actId="20577"/>
+          <ac:spMkLst>
+            <pc:docMk/>
+            <pc:sldMk cId="4267623557" sldId="259"/>
+            <ac:spMk id="2" creationId="{7AECE264-E933-4FC8-A0CD-5BE8F266428D}"/>
+          </ac:spMkLst>
+        </pc:spChg>
+        <pc:spChg chg="mod">
+          <ac:chgData name="Poornima Lakshmi Subramoni" userId="5be6b701-5b32-452b-a383-6fa42e8b5431" providerId="ADAL" clId="{7EB0C8A7-9255-4B4D-B72A-2604A9812AF8}" dt="2019-10-29T09:54:11.242" v="1962" actId="20577"/>
+          <ac:spMkLst>
+            <pc:docMk/>
+            <pc:sldMk cId="4267623557" sldId="259"/>
+            <ac:spMk id="3" creationId="{9B452126-E640-49FD-BC09-9B6B49808D01}"/>
+          </ac:spMkLst>
+        </pc:spChg>
+      </pc:sldChg>
+      <pc:sldChg chg="addSp delSp modSp add">
+        <pc:chgData name="Poornima Lakshmi Subramoni" userId="5be6b701-5b32-452b-a383-6fa42e8b5431" providerId="ADAL" clId="{7EB0C8A7-9255-4B4D-B72A-2604A9812AF8}" dt="2019-10-29T10:07:50.548" v="1999" actId="1076"/>
+        <pc:sldMkLst>
+          <pc:docMk/>
+          <pc:sldMk cId="2428704448" sldId="260"/>
+        </pc:sldMkLst>
+        <pc:spChg chg="mod">
+          <ac:chgData name="Poornima Lakshmi Subramoni" userId="5be6b701-5b32-452b-a383-6fa42e8b5431" providerId="ADAL" clId="{7EB0C8A7-9255-4B4D-B72A-2604A9812AF8}" dt="2019-10-24T10:55:48.719" v="88" actId="20577"/>
+          <ac:spMkLst>
+            <pc:docMk/>
+            <pc:sldMk cId="2428704448" sldId="260"/>
+            <ac:spMk id="2" creationId="{6597E14B-1682-47EC-9646-2D318FD9AD69}"/>
+          </ac:spMkLst>
+        </pc:spChg>
+        <pc:spChg chg="mod">
+          <ac:chgData name="Poornima Lakshmi Subramoni" userId="5be6b701-5b32-452b-a383-6fa42e8b5431" providerId="ADAL" clId="{7EB0C8A7-9255-4B4D-B72A-2604A9812AF8}" dt="2019-10-29T10:07:24.110" v="1992" actId="20577"/>
+          <ac:spMkLst>
+            <pc:docMk/>
+            <pc:sldMk cId="2428704448" sldId="260"/>
+            <ac:spMk id="3" creationId="{28266822-074D-44BC-8B01-69A12034198A}"/>
+          </ac:spMkLst>
+        </pc:spChg>
+        <pc:spChg chg="add del">
+          <ac:chgData name="Poornima Lakshmi Subramoni" userId="5be6b701-5b32-452b-a383-6fa42e8b5431" providerId="ADAL" clId="{7EB0C8A7-9255-4B4D-B72A-2604A9812AF8}" dt="2019-10-29T10:07:36.591" v="1995"/>
+          <ac:spMkLst>
+            <pc:docMk/>
+            <pc:sldMk cId="2428704448" sldId="260"/>
+            <ac:spMk id="9" creationId="{5CA552C7-A64A-4873-BE5A-CB7684146FDC}"/>
+          </ac:spMkLst>
+        </pc:spChg>
+        <pc:picChg chg="add mod">
+          <ac:chgData name="Poornima Lakshmi Subramoni" userId="5be6b701-5b32-452b-a383-6fa42e8b5431" providerId="ADAL" clId="{7EB0C8A7-9255-4B4D-B72A-2604A9812AF8}" dt="2019-10-29T09:44:35.522" v="1725" actId="1076"/>
+          <ac:picMkLst>
+            <pc:docMk/>
+            <pc:sldMk cId="2428704448" sldId="260"/>
+            <ac:picMk id="4" creationId="{C06EBA41-276B-4707-B409-CD62E61B338E}"/>
+          </ac:picMkLst>
+        </pc:picChg>
+        <pc:picChg chg="add del mod">
+          <ac:chgData name="Poornima Lakshmi Subramoni" userId="5be6b701-5b32-452b-a383-6fa42e8b5431" providerId="ADAL" clId="{7EB0C8A7-9255-4B4D-B72A-2604A9812AF8}" dt="2019-10-29T09:30:58.674" v="1648" actId="478"/>
+          <ac:picMkLst>
+            <pc:docMk/>
+            <pc:sldMk cId="2428704448" sldId="260"/>
+            <ac:picMk id="5" creationId="{6D5DDA5B-1593-42F8-9F95-D018CA0C6E70}"/>
+          </ac:picMkLst>
+        </pc:picChg>
+        <pc:picChg chg="add mod">
+          <ac:chgData name="Poornima Lakshmi Subramoni" userId="5be6b701-5b32-452b-a383-6fa42e8b5431" providerId="ADAL" clId="{7EB0C8A7-9255-4B4D-B72A-2604A9812AF8}" dt="2019-10-29T09:44:36.563" v="1726" actId="1076"/>
+          <ac:picMkLst>
+            <pc:docMk/>
+            <pc:sldMk cId="2428704448" sldId="260"/>
+            <ac:picMk id="6" creationId="{5F868CFA-1C69-4325-94FC-121A895904F6}"/>
+          </ac:picMkLst>
+        </pc:picChg>
+        <pc:picChg chg="add del mod">
+          <ac:chgData name="Poornima Lakshmi Subramoni" userId="5be6b701-5b32-452b-a383-6fa42e8b5431" providerId="ADAL" clId="{7EB0C8A7-9255-4B4D-B72A-2604A9812AF8}" dt="2019-10-29T10:07:34.499" v="1993" actId="478"/>
+          <ac:picMkLst>
+            <pc:docMk/>
+            <pc:sldMk cId="2428704448" sldId="260"/>
+            <ac:picMk id="7" creationId="{2A201F06-7258-49F2-AAE3-FF2F98993C1C}"/>
+          </ac:picMkLst>
+        </pc:picChg>
+        <pc:picChg chg="add mod">
+          <ac:chgData name="Poornima Lakshmi Subramoni" userId="5be6b701-5b32-452b-a383-6fa42e8b5431" providerId="ADAL" clId="{7EB0C8A7-9255-4B4D-B72A-2604A9812AF8}" dt="2019-10-29T09:44:40.443" v="1729" actId="1076"/>
+          <ac:picMkLst>
+            <pc:docMk/>
+            <pc:sldMk cId="2428704448" sldId="260"/>
+            <ac:picMk id="8" creationId="{9764FCC1-4DCB-4EAD-B0F0-562C68474E47}"/>
+          </ac:picMkLst>
+        </pc:picChg>
+        <pc:picChg chg="add mod">
+          <ac:chgData name="Poornima Lakshmi Subramoni" userId="5be6b701-5b32-452b-a383-6fa42e8b5431" providerId="ADAL" clId="{7EB0C8A7-9255-4B4D-B72A-2604A9812AF8}" dt="2019-10-29T10:07:50.548" v="1999" actId="1076"/>
+          <ac:picMkLst>
+            <pc:docMk/>
+            <pc:sldMk cId="2428704448" sldId="260"/>
+            <ac:picMk id="10" creationId="{F388F54D-093C-460C-ADCB-0D8C2523EB00}"/>
+          </ac:picMkLst>
+        </pc:picChg>
+      </pc:sldChg>
+      <pc:sldChg chg="modSp add">
+        <pc:chgData name="Poornima Lakshmi Subramoni" userId="5be6b701-5b32-452b-a383-6fa42e8b5431" providerId="ADAL" clId="{7EB0C8A7-9255-4B4D-B72A-2604A9812AF8}" dt="2019-10-28T09:26:01.037" v="1504" actId="14100"/>
+        <pc:sldMkLst>
+          <pc:docMk/>
+          <pc:sldMk cId="724873295" sldId="261"/>
+        </pc:sldMkLst>
+        <pc:spChg chg="mod">
+          <ac:chgData name="Poornima Lakshmi Subramoni" userId="5be6b701-5b32-452b-a383-6fa42e8b5431" providerId="ADAL" clId="{7EB0C8A7-9255-4B4D-B72A-2604A9812AF8}" dt="2019-10-24T10:55:55.568" v="93" actId="20577"/>
+          <ac:spMkLst>
+            <pc:docMk/>
+            <pc:sldMk cId="724873295" sldId="261"/>
+            <ac:spMk id="2" creationId="{00BA51E8-E184-44FE-8087-D2EAD89373C1}"/>
+          </ac:spMkLst>
+        </pc:spChg>
+        <pc:spChg chg="mod">
+          <ac:chgData name="Poornima Lakshmi Subramoni" userId="5be6b701-5b32-452b-a383-6fa42e8b5431" providerId="ADAL" clId="{7EB0C8A7-9255-4B4D-B72A-2604A9812AF8}" dt="2019-10-28T09:26:01.037" v="1504" actId="14100"/>
+          <ac:spMkLst>
+            <pc:docMk/>
+            <pc:sldMk cId="724873295" sldId="261"/>
+            <ac:spMk id="3" creationId="{863139CA-C8BC-4D4E-B3E4-4185F223D9B8}"/>
+          </ac:spMkLst>
+        </pc:spChg>
+      </pc:sldChg>
+      <pc:sldChg chg="modSp add">
+        <pc:chgData name="Poornima Lakshmi Subramoni" userId="5be6b701-5b32-452b-a383-6fa42e8b5431" providerId="ADAL" clId="{7EB0C8A7-9255-4B4D-B72A-2604A9812AF8}" dt="2019-10-28T09:26:58.141" v="1527"/>
+        <pc:sldMkLst>
+          <pc:docMk/>
+          <pc:sldMk cId="1339038383" sldId="262"/>
+        </pc:sldMkLst>
+        <pc:spChg chg="mod">
+          <ac:chgData name="Poornima Lakshmi Subramoni" userId="5be6b701-5b32-452b-a383-6fa42e8b5431" providerId="ADAL" clId="{7EB0C8A7-9255-4B4D-B72A-2604A9812AF8}" dt="2019-10-24T10:56:04.390" v="105" actId="20577"/>
+          <ac:spMkLst>
+            <pc:docMk/>
+            <pc:sldMk cId="1339038383" sldId="262"/>
+            <ac:spMk id="2" creationId="{A891CF9D-5E94-4CBB-A21F-D888497EBA81}"/>
+          </ac:spMkLst>
+        </pc:spChg>
+        <pc:spChg chg="mod">
+          <ac:chgData name="Poornima Lakshmi Subramoni" userId="5be6b701-5b32-452b-a383-6fa42e8b5431" providerId="ADAL" clId="{7EB0C8A7-9255-4B4D-B72A-2604A9812AF8}" dt="2019-10-28T09:26:58.141" v="1527"/>
+          <ac:spMkLst>
+            <pc:docMk/>
+            <pc:sldMk cId="1339038383" sldId="262"/>
+            <ac:spMk id="3" creationId="{B6A593CF-23FA-4D78-A398-452B6578AA82}"/>
+          </ac:spMkLst>
+        </pc:spChg>
+      </pc:sldChg>
+      <pc:sldChg chg="addSp delSp modSp add del ord">
+        <pc:chgData name="Poornima Lakshmi Subramoni" userId="5be6b701-5b32-452b-a383-6fa42e8b5431" providerId="ADAL" clId="{7EB0C8A7-9255-4B4D-B72A-2604A9812AF8}" dt="2019-10-30T09:52:12.899" v="2009" actId="2696"/>
+        <pc:sldMkLst>
+          <pc:docMk/>
+          <pc:sldMk cId="1220202617" sldId="263"/>
+        </pc:sldMkLst>
+        <pc:spChg chg="mod">
+          <ac:chgData name="Poornima Lakshmi Subramoni" userId="5be6b701-5b32-452b-a383-6fa42e8b5431" providerId="ADAL" clId="{7EB0C8A7-9255-4B4D-B72A-2604A9812AF8}" dt="2019-10-24T11:20:51.898" v="483" actId="20577"/>
+          <ac:spMkLst>
+            <pc:docMk/>
+            <pc:sldMk cId="1220202617" sldId="263"/>
+            <ac:spMk id="2" creationId="{166E58BA-31CC-408C-9581-7BA539B6CE38}"/>
+          </ac:spMkLst>
+        </pc:spChg>
+        <pc:spChg chg="del mod">
+          <ac:chgData name="Poornima Lakshmi Subramoni" userId="5be6b701-5b32-452b-a383-6fa42e8b5431" providerId="ADAL" clId="{7EB0C8A7-9255-4B4D-B72A-2604A9812AF8}" dt="2019-10-24T11:20:15.711" v="467" actId="478"/>
+          <ac:spMkLst>
+            <pc:docMk/>
+            <pc:sldMk cId="1220202617" sldId="263"/>
+            <ac:spMk id="3" creationId="{EBF4C8F6-9317-42F7-AA8C-5E1A5A7AC280}"/>
+          </ac:spMkLst>
+        </pc:spChg>
+        <pc:spChg chg="add del mod">
+          <ac:chgData name="Poornima Lakshmi Subramoni" userId="5be6b701-5b32-452b-a383-6fa42e8b5431" providerId="ADAL" clId="{7EB0C8A7-9255-4B4D-B72A-2604A9812AF8}" dt="2019-10-29T09:48:05.919" v="1734" actId="478"/>
+          <ac:spMkLst>
+            <pc:docMk/>
+            <pc:sldMk cId="1220202617" sldId="263"/>
+            <ac:spMk id="4" creationId="{FF26BF6E-1D8A-4374-B2C8-F695100C5FD7}"/>
+          </ac:spMkLst>
+        </pc:spChg>
+        <pc:spChg chg="add del mod">
+          <ac:chgData name="Poornima Lakshmi Subramoni" userId="5be6b701-5b32-452b-a383-6fa42e8b5431" providerId="ADAL" clId="{7EB0C8A7-9255-4B4D-B72A-2604A9812AF8}" dt="2019-10-24T11:20:39.349" v="468" actId="931"/>
+          <ac:spMkLst>
+            <pc:docMk/>
+            <pc:sldMk cId="1220202617" sldId="263"/>
+            <ac:spMk id="5" creationId="{8FB9EE3E-07EE-498A-A63D-E15D4F882D69}"/>
+          </ac:spMkLst>
+        </pc:spChg>
+        <pc:picChg chg="add del mod">
+          <ac:chgData name="Poornima Lakshmi Subramoni" userId="5be6b701-5b32-452b-a383-6fa42e8b5431" providerId="ADAL" clId="{7EB0C8A7-9255-4B4D-B72A-2604A9812AF8}" dt="2019-10-30T09:51:57.992" v="2000"/>
+          <ac:picMkLst>
+            <pc:docMk/>
+            <pc:sldMk cId="1220202617" sldId="263"/>
+            <ac:picMk id="5" creationId="{DE486BF7-EF0E-4F74-9AD6-69827C9D064C}"/>
+          </ac:picMkLst>
+        </pc:picChg>
+        <pc:picChg chg="add del mod">
+          <ac:chgData name="Poornima Lakshmi Subramoni" userId="5be6b701-5b32-452b-a383-6fa42e8b5431" providerId="ADAL" clId="{7EB0C8A7-9255-4B4D-B72A-2604A9812AF8}" dt="2019-10-29T09:47:58.622" v="1730" actId="478"/>
+          <ac:picMkLst>
+            <pc:docMk/>
+            <pc:sldMk cId="1220202617" sldId="263"/>
+            <ac:picMk id="7" creationId="{84B7E3D3-EB17-4F5C-A74F-879A8A474D1A}"/>
+          </ac:picMkLst>
+        </pc:picChg>
+      </pc:sldChg>
+      <pc:sldChg chg="add">
+        <pc:chgData name="Poornima Lakshmi Subramoni" userId="5be6b701-5b32-452b-a383-6fa42e8b5431" providerId="ADAL" clId="{7EB0C8A7-9255-4B4D-B72A-2604A9812AF8}" dt="2019-10-30T09:59:23.210" v="2284"/>
+        <pc:sldMkLst>
+          <pc:docMk/>
+          <pc:sldMk cId="2777671480" sldId="263"/>
+        </pc:sldMkLst>
+      </pc:sldChg>
+    </pc:docChg>
+  </pc:docChgLst>
+</pc:chgInfo>
 </file>
 
 <file path=ppt/slideLayouts/slideLayout1.xml><?xml version="1.0" encoding="utf-8"?>
@@ -256,7 +569,7 @@
           <a:p>
             <a:fld id="{20E82A3F-D910-4598-9801-B119DD59A33E}" type="datetimeFigureOut">
               <a:rPr lang="en-DK" smtClean="0"/>
-              <a:t>24/10/2019</a:t>
+              <a:t>30/10/2019</a:t>
             </a:fld>
             <a:endParaRPr lang="en-DK"/>
           </a:p>
@@ -456,7 +769,7 @@
           <a:p>
             <a:fld id="{20E82A3F-D910-4598-9801-B119DD59A33E}" type="datetimeFigureOut">
               <a:rPr lang="en-DK" smtClean="0"/>
-              <a:t>24/10/2019</a:t>
+              <a:t>30/10/2019</a:t>
             </a:fld>
             <a:endParaRPr lang="en-DK"/>
           </a:p>
@@ -666,7 +979,7 @@
           <a:p>
             <a:fld id="{20E82A3F-D910-4598-9801-B119DD59A33E}" type="datetimeFigureOut">
               <a:rPr lang="en-DK" smtClean="0"/>
-              <a:t>24/10/2019</a:t>
+              <a:t>30/10/2019</a:t>
             </a:fld>
             <a:endParaRPr lang="en-DK"/>
           </a:p>
@@ -866,7 +1179,7 @@
           <a:p>
             <a:fld id="{20E82A3F-D910-4598-9801-B119DD59A33E}" type="datetimeFigureOut">
               <a:rPr lang="en-DK" smtClean="0"/>
-              <a:t>24/10/2019</a:t>
+              <a:t>30/10/2019</a:t>
             </a:fld>
             <a:endParaRPr lang="en-DK"/>
           </a:p>
@@ -1142,7 +1455,7 @@
           <a:p>
             <a:fld id="{20E82A3F-D910-4598-9801-B119DD59A33E}" type="datetimeFigureOut">
               <a:rPr lang="en-DK" smtClean="0"/>
-              <a:t>24/10/2019</a:t>
+              <a:t>30/10/2019</a:t>
             </a:fld>
             <a:endParaRPr lang="en-DK"/>
           </a:p>
@@ -1410,7 +1723,7 @@
           <a:p>
             <a:fld id="{20E82A3F-D910-4598-9801-B119DD59A33E}" type="datetimeFigureOut">
               <a:rPr lang="en-DK" smtClean="0"/>
-              <a:t>24/10/2019</a:t>
+              <a:t>30/10/2019</a:t>
             </a:fld>
             <a:endParaRPr lang="en-DK"/>
           </a:p>
@@ -1825,7 +2138,7 @@
           <a:p>
             <a:fld id="{20E82A3F-D910-4598-9801-B119DD59A33E}" type="datetimeFigureOut">
               <a:rPr lang="en-DK" smtClean="0"/>
-              <a:t>24/10/2019</a:t>
+              <a:t>30/10/2019</a:t>
             </a:fld>
             <a:endParaRPr lang="en-DK"/>
           </a:p>
@@ -1967,7 +2280,7 @@
           <a:p>
             <a:fld id="{20E82A3F-D910-4598-9801-B119DD59A33E}" type="datetimeFigureOut">
               <a:rPr lang="en-DK" smtClean="0"/>
-              <a:t>24/10/2019</a:t>
+              <a:t>30/10/2019</a:t>
             </a:fld>
             <a:endParaRPr lang="en-DK"/>
           </a:p>
@@ -2080,7 +2393,7 @@
           <a:p>
             <a:fld id="{20E82A3F-D910-4598-9801-B119DD59A33E}" type="datetimeFigureOut">
               <a:rPr lang="en-DK" smtClean="0"/>
-              <a:t>24/10/2019</a:t>
+              <a:t>30/10/2019</a:t>
             </a:fld>
             <a:endParaRPr lang="en-DK"/>
           </a:p>
@@ -2393,7 +2706,7 @@
           <a:p>
             <a:fld id="{20E82A3F-D910-4598-9801-B119DD59A33E}" type="datetimeFigureOut">
               <a:rPr lang="en-DK" smtClean="0"/>
-              <a:t>24/10/2019</a:t>
+              <a:t>30/10/2019</a:t>
             </a:fld>
             <a:endParaRPr lang="en-DK"/>
           </a:p>
@@ -2682,7 +2995,7 @@
           <a:p>
             <a:fld id="{20E82A3F-D910-4598-9801-B119DD59A33E}" type="datetimeFigureOut">
               <a:rPr lang="en-DK" smtClean="0"/>
-              <a:t>24/10/2019</a:t>
+              <a:t>30/10/2019</a:t>
             </a:fld>
             <a:endParaRPr lang="en-DK"/>
           </a:p>
@@ -2925,7 +3238,7 @@
           <a:p>
             <a:fld id="{20E82A3F-D910-4598-9801-B119DD59A33E}" type="datetimeFigureOut">
               <a:rPr lang="en-DK" smtClean="0"/>
-              <a:t>24/10/2019</a:t>
+              <a:t>30/10/2019</a:t>
             </a:fld>
             <a:endParaRPr lang="en-DK"/>
           </a:p>
@@ -3363,7 +3676,11 @@
           <a:bodyPr/>
           <a:lstStyle/>
           <a:p>
-            <a:endParaRPr lang="en-DK"/>
+            <a:r>
+              <a:rPr lang="en-US" dirty="0"/>
+              <a:t>Bus Stop Assistant</a:t>
+            </a:r>
+            <a:endParaRPr lang="en-DK" dirty="0"/>
           </a:p>
         </p:txBody>
       </p:sp>
@@ -3396,6 +3713,1027 @@
     <p:extLst>
       <p:ext uri="{BB962C8B-B14F-4D97-AF65-F5344CB8AC3E}">
         <p14:creationId xmlns:p14="http://schemas.microsoft.com/office/powerpoint/2010/main" val="3728795232"/>
+      </p:ext>
+    </p:extLst>
+  </p:cSld>
+  <p:clrMapOvr>
+    <a:masterClrMapping/>
+  </p:clrMapOvr>
+</p:sld>
+</file>
+
+<file path=ppt/slides/slide2.xml><?xml version="1.0" encoding="utf-8"?>
+<p:sld xmlns:a="http://schemas.openxmlformats.org/drawingml/2006/main" xmlns:r="http://schemas.openxmlformats.org/officeDocument/2006/relationships" xmlns:p="http://schemas.openxmlformats.org/presentationml/2006/main">
+  <p:cSld>
+    <p:spTree>
+      <p:nvGrpSpPr>
+        <p:cNvPr id="1" name=""/>
+        <p:cNvGrpSpPr/>
+        <p:nvPr/>
+      </p:nvGrpSpPr>
+      <p:grpSpPr>
+        <a:xfrm>
+          <a:off x="0" y="0"/>
+          <a:ext cx="0" cy="0"/>
+          <a:chOff x="0" y="0"/>
+          <a:chExt cx="0" cy="0"/>
+        </a:xfrm>
+      </p:grpSpPr>
+      <p:sp>
+        <p:nvSpPr>
+          <p:cNvPr id="2" name="Title 1">
+            <a:extLst>
+              <a:ext uri="{FF2B5EF4-FFF2-40B4-BE49-F238E27FC236}">
+                <a16:creationId xmlns:a16="http://schemas.microsoft.com/office/drawing/2014/main" id="{166E58BA-31CC-408C-9581-7BA539B6CE38}"/>
+              </a:ext>
+            </a:extLst>
+          </p:cNvPr>
+          <p:cNvSpPr>
+            <a:spLocks noGrp="1"/>
+          </p:cNvSpPr>
+          <p:nvPr>
+            <p:ph type="title"/>
+          </p:nvPr>
+        </p:nvSpPr>
+        <p:spPr/>
+        <p:txBody>
+          <a:bodyPr/>
+          <a:lstStyle/>
+          <a:p>
+            <a:r>
+              <a:rPr lang="en-US" dirty="0"/>
+              <a:t>Introduction</a:t>
+            </a:r>
+            <a:endParaRPr lang="en-DK" dirty="0"/>
+          </a:p>
+        </p:txBody>
+      </p:sp>
+      <p:sp>
+        <p:nvSpPr>
+          <p:cNvPr id="3" name="Content Placeholder 2">
+            <a:extLst>
+              <a:ext uri="{FF2B5EF4-FFF2-40B4-BE49-F238E27FC236}">
+                <a16:creationId xmlns:a16="http://schemas.microsoft.com/office/drawing/2014/main" id="{EBF4C8F6-9317-42F7-AA8C-5E1A5A7AC280}"/>
+              </a:ext>
+            </a:extLst>
+          </p:cNvPr>
+          <p:cNvSpPr>
+            <a:spLocks noGrp="1"/>
+          </p:cNvSpPr>
+          <p:nvPr>
+            <p:ph idx="1"/>
+          </p:nvPr>
+        </p:nvSpPr>
+        <p:spPr>
+          <a:xfrm>
+            <a:off x="838201" y="1988597"/>
+            <a:ext cx="2526436" cy="3710867"/>
+          </a:xfrm>
+        </p:spPr>
+        <p:txBody>
+          <a:bodyPr>
+            <a:normAutofit/>
+          </a:bodyPr>
+          <a:lstStyle/>
+          <a:p>
+            <a:r>
+              <a:rPr lang="en-US" dirty="0"/>
+              <a:t>Read out the next bus info when someone enters a bus stop</a:t>
+            </a:r>
+          </a:p>
+          <a:p>
+            <a:endParaRPr lang="en-US" dirty="0"/>
+          </a:p>
+          <a:p>
+            <a:endParaRPr lang="en-US" dirty="0"/>
+          </a:p>
+          <a:p>
+            <a:endParaRPr lang="en-US" dirty="0"/>
+          </a:p>
+          <a:p>
+            <a:endParaRPr lang="en-DK" dirty="0"/>
+          </a:p>
+        </p:txBody>
+      </p:sp>
+      <p:pic>
+        <p:nvPicPr>
+          <p:cNvPr id="4" name="Picture 3">
+            <a:extLst>
+              <a:ext uri="{FF2B5EF4-FFF2-40B4-BE49-F238E27FC236}">
+                <a16:creationId xmlns:a16="http://schemas.microsoft.com/office/drawing/2014/main" id="{D9411F1D-F5E0-49A5-90EC-2CAEAFD59B42}"/>
+              </a:ext>
+            </a:extLst>
+          </p:cNvPr>
+          <p:cNvPicPr>
+            <a:picLocks noChangeAspect="1"/>
+          </p:cNvPicPr>
+          <p:nvPr/>
+        </p:nvPicPr>
+        <p:blipFill>
+          <a:blip r:embed="rId2"/>
+          <a:stretch>
+            <a:fillRect/>
+          </a:stretch>
+        </p:blipFill>
+        <p:spPr>
+          <a:xfrm>
+            <a:off x="3542190" y="2086649"/>
+            <a:ext cx="7029819" cy="3414915"/>
+          </a:xfrm>
+          <a:prstGeom prst="rect">
+            <a:avLst/>
+          </a:prstGeom>
+        </p:spPr>
+      </p:pic>
+    </p:spTree>
+    <p:extLst>
+      <p:ext uri="{BB962C8B-B14F-4D97-AF65-F5344CB8AC3E}">
+        <p14:creationId xmlns:p14="http://schemas.microsoft.com/office/powerpoint/2010/main" val="1869977938"/>
+      </p:ext>
+    </p:extLst>
+  </p:cSld>
+  <p:clrMapOvr>
+    <a:masterClrMapping/>
+  </p:clrMapOvr>
+</p:sld>
+</file>
+
+<file path=ppt/slides/slide3.xml><?xml version="1.0" encoding="utf-8"?>
+<p:sld xmlns:a="http://schemas.openxmlformats.org/drawingml/2006/main" xmlns:r="http://schemas.openxmlformats.org/officeDocument/2006/relationships" xmlns:p="http://schemas.openxmlformats.org/presentationml/2006/main">
+  <p:cSld>
+    <p:spTree>
+      <p:nvGrpSpPr>
+        <p:cNvPr id="1" name=""/>
+        <p:cNvGrpSpPr/>
+        <p:nvPr/>
+      </p:nvGrpSpPr>
+      <p:grpSpPr>
+        <a:xfrm>
+          <a:off x="0" y="0"/>
+          <a:ext cx="0" cy="0"/>
+          <a:chOff x="0" y="0"/>
+          <a:chExt cx="0" cy="0"/>
+        </a:xfrm>
+      </p:grpSpPr>
+      <p:sp>
+        <p:nvSpPr>
+          <p:cNvPr id="2" name="Title 1">
+            <a:extLst>
+              <a:ext uri="{FF2B5EF4-FFF2-40B4-BE49-F238E27FC236}">
+                <a16:creationId xmlns:a16="http://schemas.microsoft.com/office/drawing/2014/main" id="{166E58BA-31CC-408C-9581-7BA539B6CE38}"/>
+              </a:ext>
+            </a:extLst>
+          </p:cNvPr>
+          <p:cNvSpPr>
+            <a:spLocks noGrp="1"/>
+          </p:cNvSpPr>
+          <p:nvPr>
+            <p:ph type="title"/>
+          </p:nvPr>
+        </p:nvSpPr>
+        <p:spPr/>
+        <p:txBody>
+          <a:bodyPr/>
+          <a:lstStyle/>
+          <a:p>
+            <a:r>
+              <a:rPr lang="en-US" dirty="0"/>
+              <a:t>Introduction</a:t>
+            </a:r>
+            <a:endParaRPr lang="en-DK" dirty="0"/>
+          </a:p>
+        </p:txBody>
+      </p:sp>
+      <p:sp>
+        <p:nvSpPr>
+          <p:cNvPr id="3" name="Content Placeholder 2">
+            <a:extLst>
+              <a:ext uri="{FF2B5EF4-FFF2-40B4-BE49-F238E27FC236}">
+                <a16:creationId xmlns:a16="http://schemas.microsoft.com/office/drawing/2014/main" id="{EBF4C8F6-9317-42F7-AA8C-5E1A5A7AC280}"/>
+              </a:ext>
+            </a:extLst>
+          </p:cNvPr>
+          <p:cNvSpPr>
+            <a:spLocks noGrp="1"/>
+          </p:cNvSpPr>
+          <p:nvPr>
+            <p:ph idx="1"/>
+          </p:nvPr>
+        </p:nvSpPr>
+        <p:spPr>
+          <a:xfrm>
+            <a:off x="838201" y="1988597"/>
+            <a:ext cx="2579702" cy="4429958"/>
+          </a:xfrm>
+        </p:spPr>
+        <p:txBody>
+          <a:bodyPr>
+            <a:normAutofit fontScale="62500" lnSpcReduction="20000"/>
+          </a:bodyPr>
+          <a:lstStyle/>
+          <a:p>
+            <a:r>
+              <a:rPr lang="en-US" dirty="0"/>
+              <a:t>Human presence detected</a:t>
+            </a:r>
+          </a:p>
+          <a:p>
+            <a:r>
+              <a:rPr lang="en-US" dirty="0"/>
+              <a:t>Photon publishes topic</a:t>
+            </a:r>
+          </a:p>
+          <a:p>
+            <a:r>
+              <a:rPr lang="en-US" dirty="0"/>
+              <a:t>Client- My PC subscribes to topic</a:t>
+            </a:r>
+          </a:p>
+          <a:p>
+            <a:r>
+              <a:rPr lang="en-US" dirty="0"/>
+              <a:t>Responds by getting data from middtraffik.dk and converting it into mp3</a:t>
+            </a:r>
+          </a:p>
+          <a:p>
+            <a:r>
+              <a:rPr lang="en-US" dirty="0"/>
+              <a:t>Publishes this topic with data</a:t>
+            </a:r>
+          </a:p>
+          <a:p>
+            <a:r>
+              <a:rPr lang="en-US" dirty="0"/>
+              <a:t>Photon subscribes to this data</a:t>
+            </a:r>
+          </a:p>
+          <a:p>
+            <a:r>
+              <a:rPr lang="en-US" dirty="0"/>
+              <a:t>Plays mp3 on speakers</a:t>
+            </a:r>
+          </a:p>
+          <a:p>
+            <a:endParaRPr lang="en-US" dirty="0"/>
+          </a:p>
+          <a:p>
+            <a:endParaRPr lang="en-US" dirty="0"/>
+          </a:p>
+          <a:p>
+            <a:endParaRPr lang="en-US" dirty="0"/>
+          </a:p>
+          <a:p>
+            <a:endParaRPr lang="en-US" dirty="0"/>
+          </a:p>
+          <a:p>
+            <a:endParaRPr lang="en-DK" dirty="0"/>
+          </a:p>
+        </p:txBody>
+      </p:sp>
+      <p:pic>
+        <p:nvPicPr>
+          <p:cNvPr id="4" name="Picture 3">
+            <a:extLst>
+              <a:ext uri="{FF2B5EF4-FFF2-40B4-BE49-F238E27FC236}">
+                <a16:creationId xmlns:a16="http://schemas.microsoft.com/office/drawing/2014/main" id="{D9411F1D-F5E0-49A5-90EC-2CAEAFD59B42}"/>
+              </a:ext>
+            </a:extLst>
+          </p:cNvPr>
+          <p:cNvPicPr>
+            <a:picLocks noChangeAspect="1"/>
+          </p:cNvPicPr>
+          <p:nvPr/>
+        </p:nvPicPr>
+        <p:blipFill>
+          <a:blip r:embed="rId2"/>
+          <a:stretch>
+            <a:fillRect/>
+          </a:stretch>
+        </p:blipFill>
+        <p:spPr>
+          <a:xfrm>
+            <a:off x="3542190" y="2086649"/>
+            <a:ext cx="7029819" cy="3414915"/>
+          </a:xfrm>
+          <a:prstGeom prst="rect">
+            <a:avLst/>
+          </a:prstGeom>
+        </p:spPr>
+      </p:pic>
+    </p:spTree>
+    <p:extLst>
+      <p:ext uri="{BB962C8B-B14F-4D97-AF65-F5344CB8AC3E}">
+        <p14:creationId xmlns:p14="http://schemas.microsoft.com/office/powerpoint/2010/main" val="2777671480"/>
+      </p:ext>
+    </p:extLst>
+  </p:cSld>
+  <p:clrMapOvr>
+    <a:masterClrMapping/>
+  </p:clrMapOvr>
+</p:sld>
+</file>
+
+<file path=ppt/slides/slide4.xml><?xml version="1.0" encoding="utf-8"?>
+<p:sld xmlns:a="http://schemas.openxmlformats.org/drawingml/2006/main" xmlns:r="http://schemas.openxmlformats.org/officeDocument/2006/relationships" xmlns:p="http://schemas.openxmlformats.org/presentationml/2006/main">
+  <p:cSld>
+    <p:spTree>
+      <p:nvGrpSpPr>
+        <p:cNvPr id="1" name=""/>
+        <p:cNvGrpSpPr/>
+        <p:nvPr/>
+      </p:nvGrpSpPr>
+      <p:grpSpPr>
+        <a:xfrm>
+          <a:off x="0" y="0"/>
+          <a:ext cx="0" cy="0"/>
+          <a:chOff x="0" y="0"/>
+          <a:chExt cx="0" cy="0"/>
+        </a:xfrm>
+      </p:grpSpPr>
+      <p:sp>
+        <p:nvSpPr>
+          <p:cNvPr id="2" name="Title 1">
+            <a:extLst>
+              <a:ext uri="{FF2B5EF4-FFF2-40B4-BE49-F238E27FC236}">
+                <a16:creationId xmlns:a16="http://schemas.microsoft.com/office/drawing/2014/main" id="{D706C0CF-CC1A-4B94-86C5-7F3943B0A434}"/>
+              </a:ext>
+            </a:extLst>
+          </p:cNvPr>
+          <p:cNvSpPr>
+            <a:spLocks noGrp="1"/>
+          </p:cNvSpPr>
+          <p:nvPr>
+            <p:ph type="title"/>
+          </p:nvPr>
+        </p:nvSpPr>
+        <p:spPr/>
+        <p:txBody>
+          <a:bodyPr/>
+          <a:lstStyle/>
+          <a:p>
+            <a:r>
+              <a:rPr lang="en-US" dirty="0"/>
+              <a:t>Requirements</a:t>
+            </a:r>
+            <a:endParaRPr lang="en-DK" dirty="0"/>
+          </a:p>
+        </p:txBody>
+      </p:sp>
+      <p:sp>
+        <p:nvSpPr>
+          <p:cNvPr id="3" name="Content Placeholder 2">
+            <a:extLst>
+              <a:ext uri="{FF2B5EF4-FFF2-40B4-BE49-F238E27FC236}">
+                <a16:creationId xmlns:a16="http://schemas.microsoft.com/office/drawing/2014/main" id="{97A714F8-02C0-479A-B185-DE151F65924A}"/>
+              </a:ext>
+            </a:extLst>
+          </p:cNvPr>
+          <p:cNvSpPr>
+            <a:spLocks noGrp="1"/>
+          </p:cNvSpPr>
+          <p:nvPr>
+            <p:ph idx="1"/>
+          </p:nvPr>
+        </p:nvSpPr>
+        <p:spPr>
+          <a:xfrm>
+            <a:off x="971365" y="1775533"/>
+            <a:ext cx="8074981" cy="4303775"/>
+          </a:xfrm>
+        </p:spPr>
+        <p:txBody>
+          <a:bodyPr/>
+          <a:lstStyle/>
+          <a:p>
+            <a:endParaRPr lang="en-US" dirty="0"/>
+          </a:p>
+          <a:p>
+            <a:r>
+              <a:rPr lang="en-US" dirty="0"/>
+              <a:t>Permission from midttraffik.dk to access real time data</a:t>
+            </a:r>
+          </a:p>
+          <a:p>
+            <a:r>
+              <a:rPr lang="en-US" dirty="0"/>
+              <a:t>A PC connected to internet</a:t>
+            </a:r>
+          </a:p>
+          <a:p>
+            <a:r>
+              <a:rPr lang="en-US" dirty="0"/>
+              <a:t>Text to voice converter in the PC</a:t>
+            </a:r>
+          </a:p>
+          <a:p>
+            <a:r>
+              <a:rPr lang="en-US" dirty="0"/>
+              <a:t>Availability of WIFI to IOT device on the bus stop</a:t>
+            </a:r>
+          </a:p>
+          <a:p>
+            <a:r>
+              <a:rPr lang="en-US" dirty="0"/>
+              <a:t>Power supply for the speakers</a:t>
+            </a:r>
+          </a:p>
+          <a:p>
+            <a:endParaRPr lang="en-US" dirty="0"/>
+          </a:p>
+          <a:p>
+            <a:endParaRPr lang="en-US" dirty="0"/>
+          </a:p>
+          <a:p>
+            <a:endParaRPr lang="en-US" dirty="0"/>
+          </a:p>
+          <a:p>
+            <a:endParaRPr lang="en-US" dirty="0"/>
+          </a:p>
+          <a:p>
+            <a:endParaRPr lang="en-US" dirty="0"/>
+          </a:p>
+          <a:p>
+            <a:endParaRPr lang="en-DK" dirty="0"/>
+          </a:p>
+        </p:txBody>
+      </p:sp>
+    </p:spTree>
+    <p:extLst>
+      <p:ext uri="{BB962C8B-B14F-4D97-AF65-F5344CB8AC3E}">
+        <p14:creationId xmlns:p14="http://schemas.microsoft.com/office/powerpoint/2010/main" val="3259167666"/>
+      </p:ext>
+    </p:extLst>
+  </p:cSld>
+  <p:clrMapOvr>
+    <a:masterClrMapping/>
+  </p:clrMapOvr>
+</p:sld>
+</file>
+
+<file path=ppt/slides/slide5.xml><?xml version="1.0" encoding="utf-8"?>
+<p:sld xmlns:a="http://schemas.openxmlformats.org/drawingml/2006/main" xmlns:r="http://schemas.openxmlformats.org/officeDocument/2006/relationships" xmlns:p="http://schemas.openxmlformats.org/presentationml/2006/main">
+  <p:cSld>
+    <p:spTree>
+      <p:nvGrpSpPr>
+        <p:cNvPr id="1" name=""/>
+        <p:cNvGrpSpPr/>
+        <p:nvPr/>
+      </p:nvGrpSpPr>
+      <p:grpSpPr>
+        <a:xfrm>
+          <a:off x="0" y="0"/>
+          <a:ext cx="0" cy="0"/>
+          <a:chOff x="0" y="0"/>
+          <a:chExt cx="0" cy="0"/>
+        </a:xfrm>
+      </p:grpSpPr>
+      <p:sp>
+        <p:nvSpPr>
+          <p:cNvPr id="2" name="Title 1">
+            <a:extLst>
+              <a:ext uri="{FF2B5EF4-FFF2-40B4-BE49-F238E27FC236}">
+                <a16:creationId xmlns:a16="http://schemas.microsoft.com/office/drawing/2014/main" id="{7AECE264-E933-4FC8-A0CD-5BE8F266428D}"/>
+              </a:ext>
+            </a:extLst>
+          </p:cNvPr>
+          <p:cNvSpPr>
+            <a:spLocks noGrp="1"/>
+          </p:cNvSpPr>
+          <p:nvPr>
+            <p:ph type="title"/>
+          </p:nvPr>
+        </p:nvSpPr>
+        <p:spPr/>
+        <p:txBody>
+          <a:bodyPr/>
+          <a:lstStyle/>
+          <a:p>
+            <a:r>
+              <a:rPr lang="en-US" dirty="0"/>
+              <a:t>Technical Challenges</a:t>
+            </a:r>
+            <a:endParaRPr lang="en-DK" dirty="0"/>
+          </a:p>
+        </p:txBody>
+      </p:sp>
+      <p:sp>
+        <p:nvSpPr>
+          <p:cNvPr id="3" name="Content Placeholder 2">
+            <a:extLst>
+              <a:ext uri="{FF2B5EF4-FFF2-40B4-BE49-F238E27FC236}">
+                <a16:creationId xmlns:a16="http://schemas.microsoft.com/office/drawing/2014/main" id="{9B452126-E640-49FD-BC09-9B6B49808D01}"/>
+              </a:ext>
+            </a:extLst>
+          </p:cNvPr>
+          <p:cNvSpPr>
+            <a:spLocks noGrp="1"/>
+          </p:cNvSpPr>
+          <p:nvPr>
+            <p:ph idx="1"/>
+          </p:nvPr>
+        </p:nvSpPr>
+        <p:spPr/>
+        <p:txBody>
+          <a:bodyPr/>
+          <a:lstStyle/>
+          <a:p>
+            <a:r>
+              <a:rPr lang="en-US" dirty="0"/>
+              <a:t>Converting bus information data into an audio file</a:t>
+            </a:r>
+          </a:p>
+          <a:p>
+            <a:endParaRPr lang="en-US" dirty="0"/>
+          </a:p>
+          <a:p>
+            <a:endParaRPr lang="en-US" dirty="0"/>
+          </a:p>
+        </p:txBody>
+      </p:sp>
+    </p:spTree>
+    <p:extLst>
+      <p:ext uri="{BB962C8B-B14F-4D97-AF65-F5344CB8AC3E}">
+        <p14:creationId xmlns:p14="http://schemas.microsoft.com/office/powerpoint/2010/main" val="4267623557"/>
+      </p:ext>
+    </p:extLst>
+  </p:cSld>
+  <p:clrMapOvr>
+    <a:masterClrMapping/>
+  </p:clrMapOvr>
+</p:sld>
+</file>
+
+<file path=ppt/slides/slide6.xml><?xml version="1.0" encoding="utf-8"?>
+<p:sld xmlns:a="http://schemas.openxmlformats.org/drawingml/2006/main" xmlns:r="http://schemas.openxmlformats.org/officeDocument/2006/relationships" xmlns:p="http://schemas.openxmlformats.org/presentationml/2006/main">
+  <p:cSld>
+    <p:spTree>
+      <p:nvGrpSpPr>
+        <p:cNvPr id="1" name=""/>
+        <p:cNvGrpSpPr/>
+        <p:nvPr/>
+      </p:nvGrpSpPr>
+      <p:grpSpPr>
+        <a:xfrm>
+          <a:off x="0" y="0"/>
+          <a:ext cx="0" cy="0"/>
+          <a:chOff x="0" y="0"/>
+          <a:chExt cx="0" cy="0"/>
+        </a:xfrm>
+      </p:grpSpPr>
+      <p:sp>
+        <p:nvSpPr>
+          <p:cNvPr id="2" name="Title 1">
+            <a:extLst>
+              <a:ext uri="{FF2B5EF4-FFF2-40B4-BE49-F238E27FC236}">
+                <a16:creationId xmlns:a16="http://schemas.microsoft.com/office/drawing/2014/main" id="{6597E14B-1682-47EC-9646-2D318FD9AD69}"/>
+              </a:ext>
+            </a:extLst>
+          </p:cNvPr>
+          <p:cNvSpPr>
+            <a:spLocks noGrp="1"/>
+          </p:cNvSpPr>
+          <p:nvPr>
+            <p:ph type="title"/>
+          </p:nvPr>
+        </p:nvSpPr>
+        <p:spPr/>
+        <p:txBody>
+          <a:bodyPr/>
+          <a:lstStyle/>
+          <a:p>
+            <a:r>
+              <a:rPr lang="en-US" dirty="0"/>
+              <a:t>Sensors/Actuators/Web data sources</a:t>
+            </a:r>
+            <a:endParaRPr lang="en-DK" dirty="0"/>
+          </a:p>
+        </p:txBody>
+      </p:sp>
+      <p:sp>
+        <p:nvSpPr>
+          <p:cNvPr id="3" name="Content Placeholder 2">
+            <a:extLst>
+              <a:ext uri="{FF2B5EF4-FFF2-40B4-BE49-F238E27FC236}">
+                <a16:creationId xmlns:a16="http://schemas.microsoft.com/office/drawing/2014/main" id="{28266822-074D-44BC-8B01-69A12034198A}"/>
+              </a:ext>
+            </a:extLst>
+          </p:cNvPr>
+          <p:cNvSpPr>
+            <a:spLocks noGrp="1"/>
+          </p:cNvSpPr>
+          <p:nvPr>
+            <p:ph idx="1"/>
+          </p:nvPr>
+        </p:nvSpPr>
+        <p:spPr>
+          <a:xfrm>
+            <a:off x="838200" y="1828799"/>
+            <a:ext cx="3849210" cy="4348163"/>
+          </a:xfrm>
+        </p:spPr>
+        <p:txBody>
+          <a:bodyPr>
+            <a:normAutofit fontScale="62500" lnSpcReduction="20000"/>
+          </a:bodyPr>
+          <a:lstStyle/>
+          <a:p>
+            <a:r>
+              <a:rPr lang="pt-BR" cap="all" dirty="0"/>
+              <a:t>PIR sensor- </a:t>
+            </a:r>
+            <a:r>
+              <a:rPr lang="en-US" dirty="0">
+                <a:hlinkClick r:id="rId2"/>
+              </a:rPr>
+              <a:t>https://jentronic.dk/diverse-moduler/119-infrarod-pir-sensor-modul-hc-sr501.html</a:t>
+            </a:r>
+            <a:endParaRPr lang="pt-BR" cap="all" dirty="0"/>
+          </a:p>
+          <a:p>
+            <a:r>
+              <a:rPr lang="en-US" cap="all" dirty="0"/>
+              <a:t>SPI MP3 MODULE-</a:t>
+            </a:r>
+            <a:r>
+              <a:rPr lang="en-US" dirty="0">
+                <a:hlinkClick r:id="rId3"/>
+              </a:rPr>
+              <a:t>https://www.u-buy.dk/en/search/index/view/product/B01JCI23JG/s/aideepen-yx5300-uart-control-serial-mp3-music-player-module-for-arduino-avr-arm-pic/store/store</a:t>
+            </a:r>
+            <a:endParaRPr lang="en-US" dirty="0"/>
+          </a:p>
+          <a:p>
+            <a:r>
+              <a:rPr lang="en-US" cap="all" dirty="0"/>
+              <a:t>Audio amplifier- </a:t>
+            </a:r>
+            <a:br>
+              <a:rPr lang="en-US" cap="all" dirty="0"/>
+            </a:br>
+            <a:r>
+              <a:rPr lang="en-US" dirty="0">
+                <a:hlinkClick r:id="rId4"/>
+              </a:rPr>
+              <a:t>https://arduinoshoppen.dk/produkt/pam8403-volume-adjustment-2-channel-digital-audio-amplifier-module/</a:t>
+            </a:r>
+            <a:endParaRPr lang="en-US" cap="all" dirty="0"/>
+          </a:p>
+          <a:p>
+            <a:r>
+              <a:rPr lang="en-US" dirty="0"/>
+              <a:t>3W speaker- </a:t>
+            </a:r>
+            <a:r>
+              <a:rPr lang="en-US" dirty="0">
+                <a:hlinkClick r:id="rId5"/>
+              </a:rPr>
+              <a:t>https://jentronic.dk/audio/73-hojttaler-4-3w.html</a:t>
+            </a:r>
+            <a:endParaRPr lang="en-US" dirty="0"/>
+          </a:p>
+        </p:txBody>
+      </p:sp>
+      <p:pic>
+        <p:nvPicPr>
+          <p:cNvPr id="4" name="Picture 3">
+            <a:extLst>
+              <a:ext uri="{FF2B5EF4-FFF2-40B4-BE49-F238E27FC236}">
+                <a16:creationId xmlns:a16="http://schemas.microsoft.com/office/drawing/2014/main" id="{C06EBA41-276B-4707-B409-CD62E61B338E}"/>
+              </a:ext>
+            </a:extLst>
+          </p:cNvPr>
+          <p:cNvPicPr>
+            <a:picLocks noChangeAspect="1"/>
+          </p:cNvPicPr>
+          <p:nvPr/>
+        </p:nvPicPr>
+        <p:blipFill>
+          <a:blip r:embed="rId6"/>
+          <a:stretch>
+            <a:fillRect/>
+          </a:stretch>
+        </p:blipFill>
+        <p:spPr>
+          <a:xfrm>
+            <a:off x="5278655" y="1745355"/>
+            <a:ext cx="2015461" cy="1814309"/>
+          </a:xfrm>
+          <a:prstGeom prst="rect">
+            <a:avLst/>
+          </a:prstGeom>
+        </p:spPr>
+      </p:pic>
+      <p:pic>
+        <p:nvPicPr>
+          <p:cNvPr id="6" name="Picture 5">
+            <a:extLst>
+              <a:ext uri="{FF2B5EF4-FFF2-40B4-BE49-F238E27FC236}">
+                <a16:creationId xmlns:a16="http://schemas.microsoft.com/office/drawing/2014/main" id="{5F868CFA-1C69-4325-94FC-121A895904F6}"/>
+              </a:ext>
+            </a:extLst>
+          </p:cNvPr>
+          <p:cNvPicPr>
+            <a:picLocks noChangeAspect="1"/>
+          </p:cNvPicPr>
+          <p:nvPr/>
+        </p:nvPicPr>
+        <p:blipFill>
+          <a:blip r:embed="rId7"/>
+          <a:stretch>
+            <a:fillRect/>
+          </a:stretch>
+        </p:blipFill>
+        <p:spPr>
+          <a:xfrm>
+            <a:off x="8342482" y="1813908"/>
+            <a:ext cx="1909834" cy="1677202"/>
+          </a:xfrm>
+          <a:prstGeom prst="rect">
+            <a:avLst/>
+          </a:prstGeom>
+        </p:spPr>
+      </p:pic>
+      <p:pic>
+        <p:nvPicPr>
+          <p:cNvPr id="8" name="Picture 7">
+            <a:extLst>
+              <a:ext uri="{FF2B5EF4-FFF2-40B4-BE49-F238E27FC236}">
+                <a16:creationId xmlns:a16="http://schemas.microsoft.com/office/drawing/2014/main" id="{9764FCC1-4DCB-4EAD-B0F0-562C68474E47}"/>
+              </a:ext>
+            </a:extLst>
+          </p:cNvPr>
+          <p:cNvPicPr>
+            <a:picLocks noChangeAspect="1"/>
+          </p:cNvPicPr>
+          <p:nvPr/>
+        </p:nvPicPr>
+        <p:blipFill>
+          <a:blip r:embed="rId8"/>
+          <a:stretch>
+            <a:fillRect/>
+          </a:stretch>
+        </p:blipFill>
+        <p:spPr>
+          <a:xfrm>
+            <a:off x="8443249" y="3804639"/>
+            <a:ext cx="2110451" cy="2254644"/>
+          </a:xfrm>
+          <a:prstGeom prst="rect">
+            <a:avLst/>
+          </a:prstGeom>
+        </p:spPr>
+      </p:pic>
+      <p:pic>
+        <p:nvPicPr>
+          <p:cNvPr id="10" name="Picture 9">
+            <a:extLst>
+              <a:ext uri="{FF2B5EF4-FFF2-40B4-BE49-F238E27FC236}">
+                <a16:creationId xmlns:a16="http://schemas.microsoft.com/office/drawing/2014/main" id="{F388F54D-093C-460C-ADCB-0D8C2523EB00}"/>
+              </a:ext>
+            </a:extLst>
+          </p:cNvPr>
+          <p:cNvPicPr>
+            <a:picLocks noChangeAspect="1"/>
+          </p:cNvPicPr>
+          <p:nvPr/>
+        </p:nvPicPr>
+        <p:blipFill>
+          <a:blip r:embed="rId9"/>
+          <a:stretch>
+            <a:fillRect/>
+          </a:stretch>
+        </p:blipFill>
+        <p:spPr>
+          <a:xfrm>
+            <a:off x="5400553" y="4071335"/>
+            <a:ext cx="2329552" cy="1987948"/>
+          </a:xfrm>
+          <a:prstGeom prst="rect">
+            <a:avLst/>
+          </a:prstGeom>
+        </p:spPr>
+      </p:pic>
+    </p:spTree>
+    <p:extLst>
+      <p:ext uri="{BB962C8B-B14F-4D97-AF65-F5344CB8AC3E}">
+        <p14:creationId xmlns:p14="http://schemas.microsoft.com/office/powerpoint/2010/main" val="2428704448"/>
+      </p:ext>
+    </p:extLst>
+  </p:cSld>
+  <p:clrMapOvr>
+    <a:masterClrMapping/>
+  </p:clrMapOvr>
+</p:sld>
+</file>
+
+<file path=ppt/slides/slide7.xml><?xml version="1.0" encoding="utf-8"?>
+<p:sld xmlns:a="http://schemas.openxmlformats.org/drawingml/2006/main" xmlns:r="http://schemas.openxmlformats.org/officeDocument/2006/relationships" xmlns:p="http://schemas.openxmlformats.org/presentationml/2006/main">
+  <p:cSld>
+    <p:spTree>
+      <p:nvGrpSpPr>
+        <p:cNvPr id="1" name=""/>
+        <p:cNvGrpSpPr/>
+        <p:nvPr/>
+      </p:nvGrpSpPr>
+      <p:grpSpPr>
+        <a:xfrm>
+          <a:off x="0" y="0"/>
+          <a:ext cx="0" cy="0"/>
+          <a:chOff x="0" y="0"/>
+          <a:chExt cx="0" cy="0"/>
+        </a:xfrm>
+      </p:grpSpPr>
+      <p:sp>
+        <p:nvSpPr>
+          <p:cNvPr id="2" name="Title 1">
+            <a:extLst>
+              <a:ext uri="{FF2B5EF4-FFF2-40B4-BE49-F238E27FC236}">
+                <a16:creationId xmlns:a16="http://schemas.microsoft.com/office/drawing/2014/main" id="{00BA51E8-E184-44FE-8087-D2EAD89373C1}"/>
+              </a:ext>
+            </a:extLst>
+          </p:cNvPr>
+          <p:cNvSpPr>
+            <a:spLocks noGrp="1"/>
+          </p:cNvSpPr>
+          <p:nvPr>
+            <p:ph type="title"/>
+          </p:nvPr>
+        </p:nvSpPr>
+        <p:spPr/>
+        <p:txBody>
+          <a:bodyPr/>
+          <a:lstStyle/>
+          <a:p>
+            <a:r>
+              <a:rPr lang="en-US" dirty="0"/>
+              <a:t>Test</a:t>
+            </a:r>
+            <a:endParaRPr lang="en-DK" dirty="0"/>
+          </a:p>
+        </p:txBody>
+      </p:sp>
+      <p:sp>
+        <p:nvSpPr>
+          <p:cNvPr id="3" name="Content Placeholder 2">
+            <a:extLst>
+              <a:ext uri="{FF2B5EF4-FFF2-40B4-BE49-F238E27FC236}">
+                <a16:creationId xmlns:a16="http://schemas.microsoft.com/office/drawing/2014/main" id="{863139CA-C8BC-4D4E-B3E4-4185F223D9B8}"/>
+              </a:ext>
+            </a:extLst>
+          </p:cNvPr>
+          <p:cNvSpPr>
+            <a:spLocks noGrp="1"/>
+          </p:cNvSpPr>
+          <p:nvPr>
+            <p:ph idx="1"/>
+          </p:nvPr>
+        </p:nvSpPr>
+        <p:spPr>
+          <a:xfrm>
+            <a:off x="838200" y="2157273"/>
+            <a:ext cx="5891074" cy="4019689"/>
+          </a:xfrm>
+        </p:spPr>
+        <p:txBody>
+          <a:bodyPr/>
+          <a:lstStyle/>
+          <a:p>
+            <a:r>
+              <a:rPr lang="en-US" dirty="0"/>
+              <a:t>Initially on breadboard</a:t>
+            </a:r>
+          </a:p>
+          <a:p>
+            <a:r>
+              <a:rPr lang="en-US" dirty="0"/>
+              <a:t>Tester waves arm in front of IR detector</a:t>
+            </a:r>
+          </a:p>
+          <a:p>
+            <a:r>
+              <a:rPr lang="en-US" dirty="0"/>
+              <a:t>Speaker should play the latest bus status with respect to </a:t>
+            </a:r>
+            <a:r>
+              <a:rPr lang="en-US" dirty="0" err="1"/>
+              <a:t>Birk</a:t>
+            </a:r>
+            <a:r>
+              <a:rPr lang="en-US" dirty="0"/>
+              <a:t> </a:t>
+            </a:r>
+            <a:r>
+              <a:rPr lang="en-US" dirty="0" err="1"/>
+              <a:t>Centerpark</a:t>
+            </a:r>
+            <a:r>
+              <a:rPr lang="en-US" dirty="0"/>
+              <a:t> bus stop</a:t>
+            </a:r>
+          </a:p>
+          <a:p>
+            <a:endParaRPr lang="en-DK" dirty="0"/>
+          </a:p>
+        </p:txBody>
+      </p:sp>
+    </p:spTree>
+    <p:extLst>
+      <p:ext uri="{BB962C8B-B14F-4D97-AF65-F5344CB8AC3E}">
+        <p14:creationId xmlns:p14="http://schemas.microsoft.com/office/powerpoint/2010/main" val="724873295"/>
+      </p:ext>
+    </p:extLst>
+  </p:cSld>
+  <p:clrMapOvr>
+    <a:masterClrMapping/>
+  </p:clrMapOvr>
+</p:sld>
+</file>
+
+<file path=ppt/slides/slide8.xml><?xml version="1.0" encoding="utf-8"?>
+<p:sld xmlns:a="http://schemas.openxmlformats.org/drawingml/2006/main" xmlns:r="http://schemas.openxmlformats.org/officeDocument/2006/relationships" xmlns:p="http://schemas.openxmlformats.org/presentationml/2006/main">
+  <p:cSld>
+    <p:spTree>
+      <p:nvGrpSpPr>
+        <p:cNvPr id="1" name=""/>
+        <p:cNvGrpSpPr/>
+        <p:nvPr/>
+      </p:nvGrpSpPr>
+      <p:grpSpPr>
+        <a:xfrm>
+          <a:off x="0" y="0"/>
+          <a:ext cx="0" cy="0"/>
+          <a:chOff x="0" y="0"/>
+          <a:chExt cx="0" cy="0"/>
+        </a:xfrm>
+      </p:grpSpPr>
+      <p:sp>
+        <p:nvSpPr>
+          <p:cNvPr id="2" name="Title 1">
+            <a:extLst>
+              <a:ext uri="{FF2B5EF4-FFF2-40B4-BE49-F238E27FC236}">
+                <a16:creationId xmlns:a16="http://schemas.microsoft.com/office/drawing/2014/main" id="{A891CF9D-5E94-4CBB-A21F-D888497EBA81}"/>
+              </a:ext>
+            </a:extLst>
+          </p:cNvPr>
+          <p:cNvSpPr>
+            <a:spLocks noGrp="1"/>
+          </p:cNvSpPr>
+          <p:nvPr>
+            <p:ph type="title"/>
+          </p:nvPr>
+        </p:nvSpPr>
+        <p:spPr/>
+        <p:txBody>
+          <a:bodyPr/>
+          <a:lstStyle/>
+          <a:p>
+            <a:r>
+              <a:rPr lang="en-US" dirty="0" err="1"/>
+              <a:t>Github</a:t>
+            </a:r>
+            <a:r>
+              <a:rPr lang="en-US" dirty="0"/>
+              <a:t> Repo</a:t>
+            </a:r>
+            <a:endParaRPr lang="en-DK" dirty="0"/>
+          </a:p>
+        </p:txBody>
+      </p:sp>
+      <p:sp>
+        <p:nvSpPr>
+          <p:cNvPr id="3" name="Content Placeholder 2">
+            <a:extLst>
+              <a:ext uri="{FF2B5EF4-FFF2-40B4-BE49-F238E27FC236}">
+                <a16:creationId xmlns:a16="http://schemas.microsoft.com/office/drawing/2014/main" id="{B6A593CF-23FA-4D78-A398-452B6578AA82}"/>
+              </a:ext>
+            </a:extLst>
+          </p:cNvPr>
+          <p:cNvSpPr>
+            <a:spLocks noGrp="1"/>
+          </p:cNvSpPr>
+          <p:nvPr>
+            <p:ph idx="1"/>
+          </p:nvPr>
+        </p:nvSpPr>
+        <p:spPr/>
+        <p:txBody>
+          <a:bodyPr/>
+          <a:lstStyle/>
+          <a:p>
+            <a:r>
+              <a:rPr lang="en-US" dirty="0">
+                <a:hlinkClick r:id="rId2"/>
+              </a:rPr>
+              <a:t>https://github.com/lxmii/IOT</a:t>
+            </a:r>
+            <a:endParaRPr lang="en-DK" dirty="0"/>
+          </a:p>
+        </p:txBody>
+      </p:sp>
+    </p:spTree>
+    <p:extLst>
+      <p:ext uri="{BB962C8B-B14F-4D97-AF65-F5344CB8AC3E}">
+        <p14:creationId xmlns:p14="http://schemas.microsoft.com/office/powerpoint/2010/main" val="1339038383"/>
       </p:ext>
     </p:extLst>
   </p:cSld>
@@ -3910,18 +5248,18 @@
 </file>
 
 <file path=customXml/item2.xml><?xml version="1.0" encoding="utf-8"?>
+<p:properties xmlns:p="http://schemas.microsoft.com/office/2006/metadata/properties" xmlns:xsi="http://www.w3.org/2001/XMLSchema-instance" xmlns:pc="http://schemas.microsoft.com/office/infopath/2007/PartnerControls">
+  <documentManagement/>
+</p:properties>
+</file>
+
+<file path=customXml/item3.xml><?xml version="1.0" encoding="utf-8"?>
 <?mso-contentType ?>
 <FormTemplates xmlns="http://schemas.microsoft.com/sharepoint/v3/contenttype/forms">
   <Display>DocumentLibraryForm</Display>
   <Edit>DocumentLibraryForm</Edit>
   <New>DocumentLibraryForm</New>
 </FormTemplates>
-</file>
-
-<file path=customXml/item3.xml><?xml version="1.0" encoding="utf-8"?>
-<p:properties xmlns:p="http://schemas.microsoft.com/office/2006/metadata/properties" xmlns:xsi="http://www.w3.org/2001/XMLSchema-instance" xmlns:pc="http://schemas.microsoft.com/office/infopath/2007/PartnerControls">
-  <documentManagement/>
-</p:properties>
 </file>
 
 <file path=customXml/itemProps1.xml><?xml version="1.0" encoding="utf-8"?>
@@ -3944,26 +5282,18 @@
 </file>
 
 <file path=customXml/itemProps2.xml><?xml version="1.0" encoding="utf-8"?>
+<ds:datastoreItem xmlns:ds="http://schemas.openxmlformats.org/officeDocument/2006/customXml" ds:itemID="{DE20C493-AF0B-4CDA-AF1F-0AC6E4BCCCEC}">
+  <ds:schemaRefs>
+    <ds:schemaRef ds:uri="http://schemas.microsoft.com/office/2006/metadata/properties"/>
+    <ds:schemaRef ds:uri="http://schemas.microsoft.com/office/infopath/2007/PartnerControls"/>
+  </ds:schemaRefs>
+</ds:datastoreItem>
+</file>
+
+<file path=customXml/itemProps3.xml><?xml version="1.0" encoding="utf-8"?>
 <ds:datastoreItem xmlns:ds="http://schemas.openxmlformats.org/officeDocument/2006/customXml" ds:itemID="{28AB333F-63E1-40AA-877A-D2F2149F50FF}">
   <ds:schemaRefs>
     <ds:schemaRef ds:uri="http://schemas.microsoft.com/sharepoint/v3/contenttype/forms"/>
   </ds:schemaRefs>
 </ds:datastoreItem>
-</file>
-
-<file path=customXml/itemProps3.xml><?xml version="1.0" encoding="utf-8"?>
-<ds:datastoreItem xmlns:ds="http://schemas.openxmlformats.org/officeDocument/2006/customXml" ds:itemID="{DE20C493-AF0B-4CDA-AF1F-0AC6E4BCCCEC}">
-  <ds:schemaRefs>
-    <ds:schemaRef ds:uri="http://schemas.openxmlformats.org/package/2006/metadata/core-properties"/>
-    <ds:schemaRef ds:uri="http://schemas.microsoft.com/office/2006/metadata/properties"/>
-    <ds:schemaRef ds:uri="http://schemas.microsoft.com/office/2006/documentManagement/types"/>
-    <ds:schemaRef ds:uri="http://www.w3.org/XML/1998/namespace"/>
-    <ds:schemaRef ds:uri="http://purl.org/dc/terms/"/>
-    <ds:schemaRef ds:uri="http://purl.org/dc/dcmitype/"/>
-    <ds:schemaRef ds:uri="a3d51a65-5529-4367-9dff-bfdf01be1962"/>
-    <ds:schemaRef ds:uri="http://schemas.microsoft.com/office/infopath/2007/PartnerControls"/>
-    <ds:schemaRef ds:uri="4994b77d-9ce0-45d0-ba7f-5bdcd15c563b"/>
-    <ds:schemaRef ds:uri="http://purl.org/dc/elements/1.1/"/>
-  </ds:schemaRefs>
-</ds:datastoreItem>
 </file>
</xml_diff>